<commit_message>
Updates presentation with repository location
</commit_message>
<xml_diff>
--- a/ansible.pptx
+++ b/ansible.pptx
@@ -7922,15 +7922,14 @@
             </a:r>
           </a:p>
           <a:p>
-            <a:pPr marL="285750" indent="-285750">
-              <a:buFontTx/>
-              <a:buChar char="-"/>
-            </a:pPr>
-            <a:endParaRPr lang="nl-NL" sz="1300" dirty="0">
-              <a:solidFill>
-                <a:schemeClr val="bg1"/>
-              </a:solidFill>
-            </a:endParaRPr>
+            <a:r>
+              <a:rPr lang="nl-NL" sz="1300" dirty="0">
+                <a:solidFill>
+                  <a:schemeClr val="bg1"/>
+                </a:solidFill>
+              </a:rPr>
+              <a:t>https://github.com/AMIS-Services/ansible_sig_1</a:t>
+            </a:r>
           </a:p>
           <a:p>
             <a:endParaRPr lang="nl-NL" sz="1300" dirty="0">
@@ -11874,10 +11873,14 @@
             </a:r>
           </a:p>
           <a:p>
-            <a:pPr marL="285750" indent="-285750">
-              <a:buFontTx/>
-              <a:buChar char="-"/>
-            </a:pPr>
+            <a:r>
+              <a:rPr lang="nl-NL" sz="1300">
+                <a:solidFill>
+                  <a:schemeClr val="bg1"/>
+                </a:solidFill>
+              </a:rPr>
+              <a:t>https://github.com/AMIS-Services/ansible_sig_1</a:t>
+            </a:r>
             <a:endParaRPr lang="nl-NL" sz="1300" dirty="0">
               <a:solidFill>
                 <a:schemeClr val="bg1"/>
@@ -11960,7 +11963,12 @@
             <p:ph idx="1"/>
           </p:nvPr>
         </p:nvSpPr>
-        <p:spPr/>
+        <p:spPr>
+          <a:xfrm>
+            <a:off x="720000" y="900001"/>
+            <a:ext cx="4591588" cy="3401999"/>
+          </a:xfrm>
+        </p:spPr>
         <p:txBody>
           <a:bodyPr/>
           <a:lstStyle/>
@@ -12120,7 +12128,19 @@
             </a:r>
           </a:p>
           <a:p>
-            <a:endParaRPr lang="nl-NL" dirty="0"/>
+            <a:pPr marL="180000" lvl="1" indent="0">
+              <a:buNone/>
+            </a:pPr>
+            <a:r>
+              <a:rPr lang="nl-NL" dirty="0">
+                <a:hlinkClick r:id="rId2"/>
+              </a:rPr>
+              <a:t>https://github.com/AMIS-Services/ansible_sig_1</a:t>
+            </a:r>
+            <a:r>
+              <a:rPr lang="nl-NL" dirty="0"/>
+              <a:t> </a:t>
+            </a:r>
           </a:p>
           <a:p>
             <a:r>
@@ -12252,10 +12272,10 @@
           <p:nvPr/>
         </p:nvPicPr>
         <p:blipFill>
-          <a:blip r:embed="rId2">
+          <a:blip r:embed="rId3">
             <a:extLst>
               <a:ext uri="{96DAC541-7B7A-43D3-8B79-37D633B846F1}">
-                <asvg:svgBlip xmlns:asvg="http://schemas.microsoft.com/office/drawing/2016/SVG/main" r:embed="rId3"/>
+                <asvg:svgBlip xmlns:asvg="http://schemas.microsoft.com/office/drawing/2016/SVG/main" r:embed="rId4"/>
               </a:ext>
             </a:extLst>
           </a:blip>

</xml_diff>